<commit_message>
Updated AST document with 3AC
</commit_message>
<xml_diff>
--- a/documentation/Annotated Syntax Trees.pptx
+++ b/documentation/Annotated Syntax Trees.pptx
@@ -109,6 +109,11 @@
       </a:defRPr>
     </a:lvl9pPr>
   </p:defaultTextStyle>
+  <p:extLst>
+    <p:ext uri="{EFAFB233-063F-42B5-8137-9DF3F51BA10A}">
+      <p15:sldGuideLst xmlns:p15="http://schemas.microsoft.com/office/powerpoint/2012/main"/>
+    </p:ext>
+  </p:extLst>
 </p:presentation>
 </file>
 
@@ -259,7 +264,7 @@
           <a:p>
             <a:fld id="{051FD8DF-3B4C-4AA7-941C-19107AF5CA97}" type="datetimeFigureOut">
               <a:rPr lang="en-US" smtClean="0"/>
-              <a:t>2/12/2019</a:t>
+              <a:t>2/14/2019</a:t>
             </a:fld>
             <a:endParaRPr lang="en-US"/>
           </a:p>
@@ -457,7 +462,7 @@
           <a:p>
             <a:fld id="{051FD8DF-3B4C-4AA7-941C-19107AF5CA97}" type="datetimeFigureOut">
               <a:rPr lang="en-US" smtClean="0"/>
-              <a:t>2/12/2019</a:t>
+              <a:t>2/14/2019</a:t>
             </a:fld>
             <a:endParaRPr lang="en-US"/>
           </a:p>
@@ -665,7 +670,7 @@
           <a:p>
             <a:fld id="{051FD8DF-3B4C-4AA7-941C-19107AF5CA97}" type="datetimeFigureOut">
               <a:rPr lang="en-US" smtClean="0"/>
-              <a:t>2/12/2019</a:t>
+              <a:t>2/14/2019</a:t>
             </a:fld>
             <a:endParaRPr lang="en-US"/>
           </a:p>
@@ -863,7 +868,7 @@
           <a:p>
             <a:fld id="{051FD8DF-3B4C-4AA7-941C-19107AF5CA97}" type="datetimeFigureOut">
               <a:rPr lang="en-US" smtClean="0"/>
-              <a:t>2/12/2019</a:t>
+              <a:t>2/14/2019</a:t>
             </a:fld>
             <a:endParaRPr lang="en-US"/>
           </a:p>
@@ -1138,7 +1143,7 @@
           <a:p>
             <a:fld id="{051FD8DF-3B4C-4AA7-941C-19107AF5CA97}" type="datetimeFigureOut">
               <a:rPr lang="en-US" smtClean="0"/>
-              <a:t>2/12/2019</a:t>
+              <a:t>2/14/2019</a:t>
             </a:fld>
             <a:endParaRPr lang="en-US"/>
           </a:p>
@@ -1403,7 +1408,7 @@
           <a:p>
             <a:fld id="{051FD8DF-3B4C-4AA7-941C-19107AF5CA97}" type="datetimeFigureOut">
               <a:rPr lang="en-US" smtClean="0"/>
-              <a:t>2/12/2019</a:t>
+              <a:t>2/14/2019</a:t>
             </a:fld>
             <a:endParaRPr lang="en-US"/>
           </a:p>
@@ -1815,7 +1820,7 @@
           <a:p>
             <a:fld id="{051FD8DF-3B4C-4AA7-941C-19107AF5CA97}" type="datetimeFigureOut">
               <a:rPr lang="en-US" smtClean="0"/>
-              <a:t>2/12/2019</a:t>
+              <a:t>2/14/2019</a:t>
             </a:fld>
             <a:endParaRPr lang="en-US"/>
           </a:p>
@@ -1956,7 +1961,7 @@
           <a:p>
             <a:fld id="{051FD8DF-3B4C-4AA7-941C-19107AF5CA97}" type="datetimeFigureOut">
               <a:rPr lang="en-US" smtClean="0"/>
-              <a:t>2/12/2019</a:t>
+              <a:t>2/14/2019</a:t>
             </a:fld>
             <a:endParaRPr lang="en-US"/>
           </a:p>
@@ -2069,7 +2074,7 @@
           <a:p>
             <a:fld id="{051FD8DF-3B4C-4AA7-941C-19107AF5CA97}" type="datetimeFigureOut">
               <a:rPr lang="en-US" smtClean="0"/>
-              <a:t>2/12/2019</a:t>
+              <a:t>2/14/2019</a:t>
             </a:fld>
             <a:endParaRPr lang="en-US"/>
           </a:p>
@@ -2380,7 +2385,7 @@
           <a:p>
             <a:fld id="{051FD8DF-3B4C-4AA7-941C-19107AF5CA97}" type="datetimeFigureOut">
               <a:rPr lang="en-US" smtClean="0"/>
-              <a:t>2/12/2019</a:t>
+              <a:t>2/14/2019</a:t>
             </a:fld>
             <a:endParaRPr lang="en-US"/>
           </a:p>
@@ -2668,7 +2673,7 @@
           <a:p>
             <a:fld id="{051FD8DF-3B4C-4AA7-941C-19107AF5CA97}" type="datetimeFigureOut">
               <a:rPr lang="en-US" smtClean="0"/>
-              <a:t>2/12/2019</a:t>
+              <a:t>2/14/2019</a:t>
             </a:fld>
             <a:endParaRPr lang="en-US"/>
           </a:p>
@@ -2909,7 +2914,7 @@
           <a:p>
             <a:fld id="{051FD8DF-3B4C-4AA7-941C-19107AF5CA97}" type="datetimeFigureOut">
               <a:rPr lang="en-US" smtClean="0"/>
-              <a:t>2/12/2019</a:t>
+              <a:t>2/14/2019</a:t>
             </a:fld>
             <a:endParaRPr lang="en-US"/>
           </a:p>
@@ -4076,6 +4081,56 @@
           </a:fontRef>
         </p:style>
       </p:cxnSp>
+      <p:sp>
+        <p:nvSpPr>
+          <p:cNvPr id="3" name="TextBox 2">
+            <a:extLst>
+              <a:ext uri="{FF2B5EF4-FFF2-40B4-BE49-F238E27FC236}">
+                <a16:creationId xmlns:a16="http://schemas.microsoft.com/office/drawing/2014/main" id="{78AE5C82-CA8F-4580-B6B6-F5E78874756A}"/>
+              </a:ext>
+            </a:extLst>
+          </p:cNvPr>
+          <p:cNvSpPr txBox="1"/>
+          <p:nvPr/>
+        </p:nvSpPr>
+        <p:spPr>
+          <a:xfrm>
+            <a:off x="365760" y="3570849"/>
+            <a:ext cx="2293034" cy="1200329"/>
+          </a:xfrm>
+          <a:prstGeom prst="rect">
+            <a:avLst/>
+          </a:prstGeom>
+          <a:noFill/>
+        </p:spPr>
+        <p:txBody>
+          <a:bodyPr wrap="square" rtlCol="0">
+            <a:spAutoFit/>
+          </a:bodyPr>
+          <a:lstStyle/>
+          <a:p>
+            <a:r>
+              <a:rPr lang="en-US" dirty="0"/>
+              <a:t>3AC</a:t>
+            </a:r>
+          </a:p>
+          <a:p>
+            <a:endParaRPr lang="en-US" dirty="0"/>
+          </a:p>
+          <a:p>
+            <a:r>
+              <a:rPr lang="en-US" dirty="0"/>
+              <a:t>0 t1 = 3 * 7 $</a:t>
+            </a:r>
+          </a:p>
+          <a:p>
+            <a:r>
+              <a:rPr lang="en-US" dirty="0"/>
+              <a:t>1 t2 = 5 + t1</a:t>
+            </a:r>
+          </a:p>
+        </p:txBody>
+      </p:sp>
     </p:spTree>
     <p:extLst>
       <p:ext uri="{BB962C8B-B14F-4D97-AF65-F5344CB8AC3E}">
@@ -4121,7 +4176,7 @@
         <p:spPr>
           <a:xfrm>
             <a:off x="112542" y="0"/>
-            <a:ext cx="2194560" cy="4154984"/>
+            <a:ext cx="2194560" cy="2954655"/>
           </a:xfrm>
           <a:prstGeom prst="rect">
             <a:avLst/>
@@ -4135,58 +4190,61 @@
           <a:lstStyle/>
           <a:p>
             <a:r>
-              <a:rPr lang="en-US" sz="2400" b="1" dirty="0"/>
+              <a:rPr lang="en-US" sz="1600" b="1" dirty="0"/>
               <a:t>If – Else AST</a:t>
             </a:r>
           </a:p>
           <a:p>
-            <a:endParaRPr lang="en-US" sz="2400" b="1" dirty="0"/>
-          </a:p>
-          <a:p>
-            <a:r>
-              <a:rPr lang="en-US" sz="2400" b="1" dirty="0"/>
+            <a:r>
+              <a:rPr lang="en-US" sz="1600" b="1" dirty="0"/>
+              <a:t>X = 4</a:t>
+            </a:r>
+          </a:p>
+          <a:p>
+            <a:r>
+              <a:rPr lang="en-US" sz="1600" b="1" dirty="0"/>
               <a:t>if( x &gt; 3)</a:t>
             </a:r>
           </a:p>
           <a:p>
             <a:r>
-              <a:rPr lang="en-US" sz="2400" b="1" dirty="0"/>
+              <a:rPr lang="en-US" sz="1600" b="1" dirty="0"/>
               <a:t>{</a:t>
             </a:r>
           </a:p>
           <a:p>
             <a:r>
-              <a:rPr lang="en-US" sz="2400" b="1" dirty="0"/>
+              <a:rPr lang="en-US" sz="1600" b="1" dirty="0"/>
               <a:t>    x  = x*x;</a:t>
             </a:r>
           </a:p>
           <a:p>
             <a:r>
-              <a:rPr lang="en-US" sz="2400" b="1" dirty="0"/>
+              <a:rPr lang="en-US" sz="1600" b="1" dirty="0"/>
               <a:t>}</a:t>
             </a:r>
           </a:p>
           <a:p>
             <a:r>
-              <a:rPr lang="en-US" sz="2400" b="1" dirty="0"/>
+              <a:rPr lang="en-US" sz="1600" b="1" dirty="0"/>
               <a:t>else</a:t>
             </a:r>
           </a:p>
           <a:p>
             <a:r>
-              <a:rPr lang="en-US" sz="2400" b="1" dirty="0"/>
+              <a:rPr lang="en-US" sz="1600" b="1" dirty="0"/>
               <a:t>{</a:t>
             </a:r>
           </a:p>
           <a:p>
             <a:r>
-              <a:rPr lang="en-US" sz="2400" b="1" dirty="0"/>
+              <a:rPr lang="en-US" sz="1600" b="1" dirty="0"/>
               <a:t>    x+3;</a:t>
             </a:r>
           </a:p>
           <a:p>
             <a:r>
-              <a:rPr lang="en-US" sz="2400" b="1" dirty="0"/>
+              <a:rPr lang="en-US" sz="1600" b="1" dirty="0"/>
               <a:t>}</a:t>
             </a:r>
           </a:p>
@@ -6400,6 +6458,97 @@
           </a:p>
         </p:txBody>
       </p:sp>
+      <p:sp>
+        <p:nvSpPr>
+          <p:cNvPr id="3" name="TextBox 2">
+            <a:extLst>
+              <a:ext uri="{FF2B5EF4-FFF2-40B4-BE49-F238E27FC236}">
+                <a16:creationId xmlns:a16="http://schemas.microsoft.com/office/drawing/2014/main" id="{5C2C5A7E-5AD8-4214-BE44-DA5F1CB617F8}"/>
+              </a:ext>
+            </a:extLst>
+          </p:cNvPr>
+          <p:cNvSpPr txBox="1"/>
+          <p:nvPr/>
+        </p:nvSpPr>
+        <p:spPr>
+          <a:xfrm>
+            <a:off x="0" y="2734957"/>
+            <a:ext cx="2004810" cy="2585323"/>
+          </a:xfrm>
+          <a:prstGeom prst="rect">
+            <a:avLst/>
+          </a:prstGeom>
+          <a:noFill/>
+        </p:spPr>
+        <p:txBody>
+          <a:bodyPr wrap="square" rtlCol="0">
+            <a:spAutoFit/>
+          </a:bodyPr>
+          <a:lstStyle/>
+          <a:p>
+            <a:r>
+              <a:rPr lang="en-US" dirty="0"/>
+              <a:t>3AC</a:t>
+            </a:r>
+          </a:p>
+          <a:p>
+            <a:r>
+              <a:rPr lang="en-US" dirty="0"/>
+              <a:t>0 x:= 4 $</a:t>
+            </a:r>
+          </a:p>
+          <a:p>
+            <a:r>
+              <a:rPr lang="en-US" dirty="0"/>
+              <a:t>1 t0:= x &gt; 3 $</a:t>
+            </a:r>
+          </a:p>
+          <a:p>
+            <a:r>
+              <a:rPr lang="en-US" dirty="0"/>
+              <a:t>2 if t0 </a:t>
+            </a:r>
+            <a:r>
+              <a:rPr lang="en-US" dirty="0" err="1"/>
+              <a:t>goto</a:t>
+            </a:r>
+            <a:r>
+              <a:rPr lang="en-US" dirty="0"/>
+              <a:t> JMP1 $ </a:t>
+            </a:r>
+          </a:p>
+          <a:p>
+            <a:r>
+              <a:rPr lang="en-US" dirty="0"/>
+              <a:t>3 t1:= x+3 $</a:t>
+            </a:r>
+          </a:p>
+          <a:p>
+            <a:r>
+              <a:rPr lang="en-US" dirty="0"/>
+              <a:t>4 x:= t1 $</a:t>
+            </a:r>
+          </a:p>
+          <a:p>
+            <a:r>
+              <a:rPr lang="en-US" dirty="0"/>
+              <a:t>5 JMP1 $</a:t>
+            </a:r>
+          </a:p>
+          <a:p>
+            <a:r>
+              <a:rPr lang="en-US" dirty="0"/>
+              <a:t>6 t2:= x * x $</a:t>
+            </a:r>
+          </a:p>
+          <a:p>
+            <a:r>
+              <a:rPr lang="en-US" dirty="0"/>
+              <a:t>7 x:= t2 $</a:t>
+            </a:r>
+          </a:p>
+        </p:txBody>
+      </p:sp>
     </p:spTree>
     <p:extLst>
       <p:ext uri="{BB962C8B-B14F-4D97-AF65-F5344CB8AC3E}">
@@ -6481,7 +6630,7 @@
         <p:spPr>
           <a:xfrm>
             <a:off x="0" y="717452"/>
-            <a:ext cx="12192000" cy="3416320"/>
+            <a:ext cx="12192000" cy="3693319"/>
           </a:xfrm>
           <a:prstGeom prst="rect">
             <a:avLst/>
@@ -6493,6 +6642,12 @@
             <a:spAutoFit/>
           </a:bodyPr>
           <a:lstStyle/>
+          <a:p>
+            <a:r>
+              <a:rPr lang="en-US" dirty="0"/>
+              <a:t>x = 11</a:t>
+            </a:r>
+          </a:p>
           <a:p>
             <a:r>
               <a:rPr lang="en-US" dirty="0"/>
@@ -10386,6 +10541,169 @@
           </a:p>
         </p:txBody>
       </p:sp>
+      <p:sp>
+        <p:nvSpPr>
+          <p:cNvPr id="2" name="TextBox 1">
+            <a:extLst>
+              <a:ext uri="{FF2B5EF4-FFF2-40B4-BE49-F238E27FC236}">
+                <a16:creationId xmlns:a16="http://schemas.microsoft.com/office/drawing/2014/main" id="{7FC46611-3A3D-48AD-9DDD-5155880B0985}"/>
+              </a:ext>
+            </a:extLst>
+          </p:cNvPr>
+          <p:cNvSpPr txBox="1"/>
+          <p:nvPr/>
+        </p:nvSpPr>
+        <p:spPr>
+          <a:xfrm>
+            <a:off x="527236" y="3201402"/>
+            <a:ext cx="1798971" cy="3754874"/>
+          </a:xfrm>
+          <a:prstGeom prst="rect">
+            <a:avLst/>
+          </a:prstGeom>
+          <a:noFill/>
+        </p:spPr>
+        <p:txBody>
+          <a:bodyPr wrap="square" rtlCol="0">
+            <a:spAutoFit/>
+          </a:bodyPr>
+          <a:lstStyle/>
+          <a:p>
+            <a:r>
+              <a:rPr lang="en-US" sz="1400" dirty="0"/>
+              <a:t>3AC</a:t>
+            </a:r>
+          </a:p>
+          <a:p>
+            <a:r>
+              <a:rPr lang="en-US" sz="1400" dirty="0"/>
+              <a:t>0 x:=11</a:t>
+            </a:r>
+          </a:p>
+          <a:p>
+            <a:r>
+              <a:rPr lang="en-US" sz="1400" dirty="0"/>
+              <a:t>1 t0: = x &lt; 10</a:t>
+            </a:r>
+          </a:p>
+          <a:p>
+            <a:r>
+              <a:rPr lang="en-US" sz="1400" dirty="0"/>
+              <a:t>2 if t0 </a:t>
+            </a:r>
+            <a:r>
+              <a:rPr lang="en-US" sz="1400" dirty="0" err="1"/>
+              <a:t>goto</a:t>
+            </a:r>
+            <a:r>
+              <a:rPr lang="en-US" sz="1400" dirty="0"/>
+              <a:t> JMP0</a:t>
+            </a:r>
+          </a:p>
+          <a:p>
+            <a:r>
+              <a:rPr lang="en-US" sz="1400" dirty="0"/>
+              <a:t>3 t1:= x % 2</a:t>
+            </a:r>
+          </a:p>
+          <a:p>
+            <a:r>
+              <a:rPr lang="en-US" sz="1400" dirty="0"/>
+              <a:t>4 t2:= t1 == 0</a:t>
+            </a:r>
+          </a:p>
+          <a:p>
+            <a:r>
+              <a:rPr lang="en-US" sz="1400" dirty="0"/>
+              <a:t>5 if t2 </a:t>
+            </a:r>
+            <a:r>
+              <a:rPr lang="en-US" sz="1400" dirty="0" err="1"/>
+              <a:t>goto</a:t>
+            </a:r>
+            <a:r>
+              <a:rPr lang="en-US" sz="1400" dirty="0"/>
+              <a:t> JMP1</a:t>
+            </a:r>
+          </a:p>
+          <a:p>
+            <a:r>
+              <a:rPr lang="en-US" sz="1400" dirty="0"/>
+              <a:t>6 t3:= x * 3</a:t>
+            </a:r>
+          </a:p>
+          <a:p>
+            <a:r>
+              <a:rPr lang="en-US" sz="1400" dirty="0"/>
+              <a:t>7 x:= t3</a:t>
+            </a:r>
+          </a:p>
+          <a:p>
+            <a:r>
+              <a:rPr lang="en-US" sz="1400" dirty="0"/>
+              <a:t>8 </a:t>
+            </a:r>
+            <a:r>
+              <a:rPr lang="en-US" sz="1400" dirty="0" err="1"/>
+              <a:t>goto</a:t>
+            </a:r>
+            <a:r>
+              <a:rPr lang="en-US" sz="1400" dirty="0"/>
+              <a:t> END1</a:t>
+            </a:r>
+          </a:p>
+          <a:p>
+            <a:r>
+              <a:rPr lang="en-US" sz="1400" dirty="0"/>
+              <a:t>8 JMP1</a:t>
+            </a:r>
+          </a:p>
+          <a:p>
+            <a:r>
+              <a:rPr lang="en-US" sz="1400" dirty="0"/>
+              <a:t>9 t4:= x + 1</a:t>
+            </a:r>
+          </a:p>
+          <a:p>
+            <a:r>
+              <a:rPr lang="en-US" sz="1400" dirty="0"/>
+              <a:t>10 x := t4</a:t>
+            </a:r>
+          </a:p>
+          <a:p>
+            <a:r>
+              <a:rPr lang="en-US" sz="1400" dirty="0"/>
+              <a:t>11 </a:t>
+            </a:r>
+            <a:r>
+              <a:rPr lang="en-US" sz="1400" dirty="0" err="1"/>
+              <a:t>goto</a:t>
+            </a:r>
+            <a:r>
+              <a:rPr lang="en-US" sz="1400" dirty="0"/>
+              <a:t> END1</a:t>
+            </a:r>
+          </a:p>
+          <a:p>
+            <a:r>
+              <a:rPr lang="en-US" sz="1400" dirty="0"/>
+              <a:t>12 JMP0</a:t>
+            </a:r>
+          </a:p>
+          <a:p>
+            <a:r>
+              <a:rPr lang="en-US" sz="1400" dirty="0"/>
+              <a:t>13 x:= 10</a:t>
+            </a:r>
+          </a:p>
+          <a:p>
+            <a:r>
+              <a:rPr lang="en-US" sz="1400" dirty="0"/>
+              <a:t>14 END1</a:t>
+            </a:r>
+          </a:p>
+        </p:txBody>
+      </p:sp>
     </p:spTree>
     <p:extLst>
       <p:ext uri="{BB962C8B-B14F-4D97-AF65-F5344CB8AC3E}">
@@ -10470,6 +10788,15 @@
         <p:txBody>
           <a:bodyPr/>
           <a:lstStyle/>
+          <a:p>
+            <a:pPr marL="0" indent="0">
+              <a:buNone/>
+            </a:pPr>
+            <a:r>
+              <a:rPr lang="en-US" dirty="0"/>
+              <a:t>X = 9</a:t>
+            </a:r>
+          </a:p>
           <a:p>
             <a:pPr marL="0" indent="0">
               <a:buNone/>
@@ -10681,7 +11008,7 @@
         </p:nvCxnSpPr>
         <p:spPr>
           <a:xfrm flipH="1">
-            <a:off x="4400887" y="944243"/>
+            <a:off x="4478619" y="846235"/>
             <a:ext cx="497558" cy="534436"/>
           </a:xfrm>
           <a:prstGeom prst="straightConnector1">
@@ -12948,6 +13275,123 @@
               <a:rPr lang="en-US" dirty="0"/>
               <a:t>False -&gt;</a:t>
             </a:r>
+          </a:p>
+        </p:txBody>
+      </p:sp>
+      <p:sp>
+        <p:nvSpPr>
+          <p:cNvPr id="2" name="TextBox 1">
+            <a:extLst>
+              <a:ext uri="{FF2B5EF4-FFF2-40B4-BE49-F238E27FC236}">
+                <a16:creationId xmlns:a16="http://schemas.microsoft.com/office/drawing/2014/main" id="{87A69ED9-4E71-4C5C-AF77-4D4624BC0177}"/>
+              </a:ext>
+            </a:extLst>
+          </p:cNvPr>
+          <p:cNvSpPr txBox="1"/>
+          <p:nvPr/>
+        </p:nvSpPr>
+        <p:spPr>
+          <a:xfrm>
+            <a:off x="9228406" y="702790"/>
+            <a:ext cx="2231442" cy="3970318"/>
+          </a:xfrm>
+          <a:prstGeom prst="rect">
+            <a:avLst/>
+          </a:prstGeom>
+          <a:noFill/>
+        </p:spPr>
+        <p:txBody>
+          <a:bodyPr wrap="square" rtlCol="0">
+            <a:spAutoFit/>
+          </a:bodyPr>
+          <a:lstStyle/>
+          <a:p>
+            <a:r>
+              <a:rPr lang="en-US" dirty="0"/>
+              <a:t>3AC</a:t>
+            </a:r>
+          </a:p>
+          <a:p>
+            <a:r>
+              <a:rPr lang="en-US" dirty="0"/>
+              <a:t>0 JMP1</a:t>
+            </a:r>
+          </a:p>
+          <a:p>
+            <a:r>
+              <a:rPr lang="en-US" dirty="0"/>
+              <a:t>1 t1 := x &lt; 10</a:t>
+            </a:r>
+          </a:p>
+          <a:p>
+            <a:r>
+              <a:rPr lang="en-US" dirty="0"/>
+              <a:t>2 if t1 </a:t>
+            </a:r>
+            <a:r>
+              <a:rPr lang="en-US" dirty="0" err="1"/>
+              <a:t>goto</a:t>
+            </a:r>
+            <a:r>
+              <a:rPr lang="en-US" dirty="0"/>
+              <a:t> END1</a:t>
+            </a:r>
+          </a:p>
+          <a:p>
+            <a:r>
+              <a:rPr lang="en-US" dirty="0"/>
+              <a:t>3 t2:= x + 1</a:t>
+            </a:r>
+          </a:p>
+          <a:p>
+            <a:r>
+              <a:rPr lang="en-US" dirty="0"/>
+              <a:t>4 x:= t2</a:t>
+            </a:r>
+          </a:p>
+          <a:p>
+            <a:r>
+              <a:rPr lang="en-US" dirty="0"/>
+              <a:t>5 print x</a:t>
+            </a:r>
+          </a:p>
+          <a:p>
+            <a:r>
+              <a:rPr lang="en-US" dirty="0"/>
+              <a:t>6 </a:t>
+            </a:r>
+            <a:r>
+              <a:rPr lang="en-US" dirty="0" err="1"/>
+              <a:t>goto</a:t>
+            </a:r>
+            <a:r>
+              <a:rPr lang="en-US" dirty="0"/>
+              <a:t> JMP1</a:t>
+            </a:r>
+          </a:p>
+          <a:p>
+            <a:r>
+              <a:rPr lang="en-US" dirty="0"/>
+              <a:t>7 END1</a:t>
+            </a:r>
+          </a:p>
+          <a:p>
+            <a:r>
+              <a:rPr lang="en-US" dirty="0"/>
+              <a:t>8 ret x</a:t>
+            </a:r>
+          </a:p>
+          <a:p>
+            <a:endParaRPr lang="en-US" dirty="0"/>
+          </a:p>
+          <a:p>
+            <a:endParaRPr lang="en-US" dirty="0"/>
+          </a:p>
+          <a:p>
+            <a:endParaRPr lang="en-US" dirty="0"/>
+          </a:p>
+          <a:p>
+            <a:endParaRPr lang="en-US" dirty="0"/>
           </a:p>
         </p:txBody>
       </p:sp>

</xml_diff>